<commit_message>
added lecture 11 and modified names of all of the lectures
</commit_message>
<xml_diff>
--- a/lectures/lecture #10 presentation.pptx
+++ b/lectures/lecture #10 presentation.pptx
@@ -5,7 +5,7 @@
     <p:sldMasterId id="2147483696" r:id="rId1"/>
   </p:sldMasterIdLst>
   <p:notesMasterIdLst>
-    <p:notesMasterId r:id="rId32"/>
+    <p:notesMasterId r:id="rId33"/>
   </p:notesMasterIdLst>
   <p:sldIdLst>
     <p:sldId id="425" r:id="rId2"/>
@@ -23,21 +23,22 @@
     <p:sldId id="444" r:id="rId14"/>
     <p:sldId id="452" r:id="rId15"/>
     <p:sldId id="455" r:id="rId16"/>
-    <p:sldId id="456" r:id="rId17"/>
-    <p:sldId id="457" r:id="rId18"/>
-    <p:sldId id="458" r:id="rId19"/>
-    <p:sldId id="459" r:id="rId20"/>
-    <p:sldId id="460" r:id="rId21"/>
-    <p:sldId id="461" r:id="rId22"/>
-    <p:sldId id="462" r:id="rId23"/>
-    <p:sldId id="464" r:id="rId24"/>
-    <p:sldId id="465" r:id="rId25"/>
-    <p:sldId id="466" r:id="rId26"/>
-    <p:sldId id="467" r:id="rId27"/>
-    <p:sldId id="468" r:id="rId28"/>
-    <p:sldId id="469" r:id="rId29"/>
-    <p:sldId id="470" r:id="rId30"/>
-    <p:sldId id="442" r:id="rId31"/>
+    <p:sldId id="471" r:id="rId17"/>
+    <p:sldId id="456" r:id="rId18"/>
+    <p:sldId id="457" r:id="rId19"/>
+    <p:sldId id="458" r:id="rId20"/>
+    <p:sldId id="459" r:id="rId21"/>
+    <p:sldId id="460" r:id="rId22"/>
+    <p:sldId id="461" r:id="rId23"/>
+    <p:sldId id="462" r:id="rId24"/>
+    <p:sldId id="464" r:id="rId25"/>
+    <p:sldId id="465" r:id="rId26"/>
+    <p:sldId id="466" r:id="rId27"/>
+    <p:sldId id="467" r:id="rId28"/>
+    <p:sldId id="468" r:id="rId29"/>
+    <p:sldId id="469" r:id="rId30"/>
+    <p:sldId id="470" r:id="rId31"/>
+    <p:sldId id="442" r:id="rId32"/>
   </p:sldIdLst>
   <p:sldSz cx="12192000" cy="6858000"/>
   <p:notesSz cx="6858000" cy="9144000"/>
@@ -226,7 +227,7 @@
           <a:p>
             <a:fld id="{9F16E362-832A-824E-B063-25F5DE831740}" type="datetimeFigureOut">
               <a:rPr lang="en-RU" smtClean="0"/>
-              <a:t>28.12.2021</a:t>
+              <a:t>01.01.2022</a:t>
             </a:fld>
             <a:endParaRPr lang="en-RU"/>
           </a:p>
@@ -1647,7 +1648,7 @@
     </p:spTree>
     <p:extLst>
       <p:ext uri="{BB962C8B-B14F-4D97-AF65-F5344CB8AC3E}">
-        <p14:creationId xmlns:p14="http://schemas.microsoft.com/office/powerpoint/2010/main" val="2268829334"/>
+        <p14:creationId xmlns:p14="http://schemas.microsoft.com/office/powerpoint/2010/main" val="3631271398"/>
       </p:ext>
     </p:extLst>
   </p:cSld>
@@ -1733,7 +1734,7 @@
     </p:spTree>
     <p:extLst>
       <p:ext uri="{BB962C8B-B14F-4D97-AF65-F5344CB8AC3E}">
-        <p14:creationId xmlns:p14="http://schemas.microsoft.com/office/powerpoint/2010/main" val="546188413"/>
+        <p14:creationId xmlns:p14="http://schemas.microsoft.com/office/powerpoint/2010/main" val="2268829334"/>
       </p:ext>
     </p:extLst>
   </p:cSld>
@@ -1819,7 +1820,7 @@
     </p:spTree>
     <p:extLst>
       <p:ext uri="{BB962C8B-B14F-4D97-AF65-F5344CB8AC3E}">
-        <p14:creationId xmlns:p14="http://schemas.microsoft.com/office/powerpoint/2010/main" val="626144153"/>
+        <p14:creationId xmlns:p14="http://schemas.microsoft.com/office/powerpoint/2010/main" val="546188413"/>
       </p:ext>
     </p:extLst>
   </p:cSld>
@@ -1905,7 +1906,7 @@
     </p:spTree>
     <p:extLst>
       <p:ext uri="{BB962C8B-B14F-4D97-AF65-F5344CB8AC3E}">
-        <p14:creationId xmlns:p14="http://schemas.microsoft.com/office/powerpoint/2010/main" val="885877651"/>
+        <p14:creationId xmlns:p14="http://schemas.microsoft.com/office/powerpoint/2010/main" val="626144153"/>
       </p:ext>
     </p:extLst>
   </p:cSld>
@@ -1991,7 +1992,7 @@
     </p:spTree>
     <p:extLst>
       <p:ext uri="{BB962C8B-B14F-4D97-AF65-F5344CB8AC3E}">
-        <p14:creationId xmlns:p14="http://schemas.microsoft.com/office/powerpoint/2010/main" val="2778512358"/>
+        <p14:creationId xmlns:p14="http://schemas.microsoft.com/office/powerpoint/2010/main" val="885877651"/>
       </p:ext>
     </p:extLst>
   </p:cSld>
@@ -2129,18 +2130,6 @@
           <a:bodyPr/>
           <a:lstStyle/>
           <a:p>
-            <a:r>
-              <a:rPr lang="en-GB" dirty="0"/>
-              <a:t>In the second case, no extra copy is created! – </a:t>
-            </a:r>
-            <a:r>
-              <a:rPr lang="ru-RU" dirty="0"/>
-              <a:t>прояснить этот </a:t>
-            </a:r>
-            <a:r>
-              <a:rPr lang="ru-RU" dirty="0" err="1"/>
-              <a:t>моментик</a:t>
-            </a:r>
             <a:endParaRPr lang="en-US" dirty="0">
               <a:latin typeface="Helvetica" pitchFamily="2" charset="0"/>
             </a:endParaRPr>
@@ -2173,7 +2162,7 @@
     </p:spTree>
     <p:extLst>
       <p:ext uri="{BB962C8B-B14F-4D97-AF65-F5344CB8AC3E}">
-        <p14:creationId xmlns:p14="http://schemas.microsoft.com/office/powerpoint/2010/main" val="474305697"/>
+        <p14:creationId xmlns:p14="http://schemas.microsoft.com/office/powerpoint/2010/main" val="2778512358"/>
       </p:ext>
     </p:extLst>
   </p:cSld>
@@ -2227,6 +2216,18 @@
           <a:bodyPr/>
           <a:lstStyle/>
           <a:p>
+            <a:r>
+              <a:rPr lang="en-GB" dirty="0"/>
+              <a:t>In the second case, no extra copy is created! – </a:t>
+            </a:r>
+            <a:r>
+              <a:rPr lang="ru-RU" dirty="0"/>
+              <a:t>прояснить этот </a:t>
+            </a:r>
+            <a:r>
+              <a:rPr lang="ru-RU" dirty="0" err="1"/>
+              <a:t>моментик</a:t>
+            </a:r>
             <a:endParaRPr lang="en-US" dirty="0">
               <a:latin typeface="Helvetica" pitchFamily="2" charset="0"/>
             </a:endParaRPr>
@@ -2259,7 +2260,7 @@
     </p:spTree>
     <p:extLst>
       <p:ext uri="{BB962C8B-B14F-4D97-AF65-F5344CB8AC3E}">
-        <p14:creationId xmlns:p14="http://schemas.microsoft.com/office/powerpoint/2010/main" val="2639573234"/>
+        <p14:creationId xmlns:p14="http://schemas.microsoft.com/office/powerpoint/2010/main" val="474305697"/>
       </p:ext>
     </p:extLst>
   </p:cSld>
@@ -2345,7 +2346,7 @@
     </p:spTree>
     <p:extLst>
       <p:ext uri="{BB962C8B-B14F-4D97-AF65-F5344CB8AC3E}">
-        <p14:creationId xmlns:p14="http://schemas.microsoft.com/office/powerpoint/2010/main" val="1772341300"/>
+        <p14:creationId xmlns:p14="http://schemas.microsoft.com/office/powerpoint/2010/main" val="2639573234"/>
       </p:ext>
     </p:extLst>
   </p:cSld>
@@ -2431,7 +2432,7 @@
     </p:spTree>
     <p:extLst>
       <p:ext uri="{BB962C8B-B14F-4D97-AF65-F5344CB8AC3E}">
-        <p14:creationId xmlns:p14="http://schemas.microsoft.com/office/powerpoint/2010/main" val="3619124818"/>
+        <p14:creationId xmlns:p14="http://schemas.microsoft.com/office/powerpoint/2010/main" val="1772341300"/>
       </p:ext>
     </p:extLst>
   </p:cSld>
@@ -2517,7 +2518,7 @@
     </p:spTree>
     <p:extLst>
       <p:ext uri="{BB962C8B-B14F-4D97-AF65-F5344CB8AC3E}">
-        <p14:creationId xmlns:p14="http://schemas.microsoft.com/office/powerpoint/2010/main" val="2507749428"/>
+        <p14:creationId xmlns:p14="http://schemas.microsoft.com/office/powerpoint/2010/main" val="3619124818"/>
       </p:ext>
     </p:extLst>
   </p:cSld>
@@ -2603,7 +2604,7 @@
     </p:spTree>
     <p:extLst>
       <p:ext uri="{BB962C8B-B14F-4D97-AF65-F5344CB8AC3E}">
-        <p14:creationId xmlns:p14="http://schemas.microsoft.com/office/powerpoint/2010/main" val="1868177911"/>
+        <p14:creationId xmlns:p14="http://schemas.microsoft.com/office/powerpoint/2010/main" val="2507749428"/>
       </p:ext>
     </p:extLst>
   </p:cSld>
@@ -2689,7 +2690,7 @@
     </p:spTree>
     <p:extLst>
       <p:ext uri="{BB962C8B-B14F-4D97-AF65-F5344CB8AC3E}">
-        <p14:creationId xmlns:p14="http://schemas.microsoft.com/office/powerpoint/2010/main" val="2881473552"/>
+        <p14:creationId xmlns:p14="http://schemas.microsoft.com/office/powerpoint/2010/main" val="1868177911"/>
       </p:ext>
     </p:extLst>
   </p:cSld>
@@ -2775,7 +2776,7 @@
     </p:spTree>
     <p:extLst>
       <p:ext uri="{BB962C8B-B14F-4D97-AF65-F5344CB8AC3E}">
-        <p14:creationId xmlns:p14="http://schemas.microsoft.com/office/powerpoint/2010/main" val="3387595813"/>
+        <p14:creationId xmlns:p14="http://schemas.microsoft.com/office/powerpoint/2010/main" val="2881473552"/>
       </p:ext>
     </p:extLst>
   </p:cSld>
@@ -2853,6 +2854,92 @@
             <a:fld id="{45EAD37F-4CAA-4C4E-B967-8FF85B62072E}" type="slidenum">
               <a:rPr lang="en-RU" smtClean="0"/>
               <a:t>29</a:t>
+            </a:fld>
+            <a:endParaRPr lang="en-RU"/>
+          </a:p>
+        </p:txBody>
+      </p:sp>
+    </p:spTree>
+    <p:extLst>
+      <p:ext uri="{BB962C8B-B14F-4D97-AF65-F5344CB8AC3E}">
+        <p14:creationId xmlns:p14="http://schemas.microsoft.com/office/powerpoint/2010/main" val="3387595813"/>
+      </p:ext>
+    </p:extLst>
+  </p:cSld>
+  <p:clrMapOvr>
+    <a:masterClrMapping/>
+  </p:clrMapOvr>
+</p:notes>
+</file>
+
+<file path=ppt/notesSlides/notesSlide29.xml><?xml version="1.0" encoding="utf-8"?>
+<p:notes xmlns:a="http://schemas.openxmlformats.org/drawingml/2006/main" xmlns:r="http://schemas.openxmlformats.org/officeDocument/2006/relationships" xmlns:p="http://schemas.openxmlformats.org/presentationml/2006/main">
+  <p:cSld>
+    <p:spTree>
+      <p:nvGrpSpPr>
+        <p:cNvPr id="1" name=""/>
+        <p:cNvGrpSpPr/>
+        <p:nvPr/>
+      </p:nvGrpSpPr>
+      <p:grpSpPr>
+        <a:xfrm>
+          <a:off x="0" y="0"/>
+          <a:ext cx="0" cy="0"/>
+          <a:chOff x="0" y="0"/>
+          <a:chExt cx="0" cy="0"/>
+        </a:xfrm>
+      </p:grpSpPr>
+      <p:sp>
+        <p:nvSpPr>
+          <p:cNvPr id="2" name="Slide Image Placeholder 1"/>
+          <p:cNvSpPr>
+            <a:spLocks noGrp="1" noRot="1" noChangeAspect="1"/>
+          </p:cNvSpPr>
+          <p:nvPr>
+            <p:ph type="sldImg"/>
+          </p:nvPr>
+        </p:nvSpPr>
+        <p:spPr/>
+      </p:sp>
+      <p:sp>
+        <p:nvSpPr>
+          <p:cNvPr id="3" name="Notes Placeholder 2"/>
+          <p:cNvSpPr>
+            <a:spLocks noGrp="1"/>
+          </p:cNvSpPr>
+          <p:nvPr>
+            <p:ph type="body" idx="1"/>
+          </p:nvPr>
+        </p:nvSpPr>
+        <p:spPr/>
+        <p:txBody>
+          <a:bodyPr/>
+          <a:lstStyle/>
+          <a:p>
+            <a:endParaRPr lang="en-US" dirty="0">
+              <a:latin typeface="Helvetica" pitchFamily="2" charset="0"/>
+            </a:endParaRPr>
+          </a:p>
+        </p:txBody>
+      </p:sp>
+      <p:sp>
+        <p:nvSpPr>
+          <p:cNvPr id="4" name="Slide Number Placeholder 3"/>
+          <p:cNvSpPr>
+            <a:spLocks noGrp="1"/>
+          </p:cNvSpPr>
+          <p:nvPr>
+            <p:ph type="sldNum" sz="quarter" idx="5"/>
+          </p:nvPr>
+        </p:nvSpPr>
+        <p:spPr/>
+        <p:txBody>
+          <a:bodyPr/>
+          <a:lstStyle/>
+          <a:p>
+            <a:fld id="{45EAD37F-4CAA-4C4E-B967-8FF85B62072E}" type="slidenum">
+              <a:rPr lang="en-RU" smtClean="0"/>
+              <a:t>30</a:t>
             </a:fld>
             <a:endParaRPr lang="en-RU"/>
           </a:p>
@@ -7142,6 +7229,220 @@
           <a:p>
             <a:r>
               <a:rPr lang="en-US" dirty="0"/>
+              <a:t>Static member field </a:t>
+            </a:r>
+            <a:endParaRPr lang="ru-RU" dirty="0"/>
+          </a:p>
+        </p:txBody>
+      </p:sp>
+      <p:sp>
+        <p:nvSpPr>
+          <p:cNvPr id="3" name="TextBox 2">
+            <a:extLst>
+              <a:ext uri="{FF2B5EF4-FFF2-40B4-BE49-F238E27FC236}">
+                <a16:creationId xmlns:a16="http://schemas.microsoft.com/office/drawing/2014/main" id="{9E634352-3C3E-D44F-8144-7B1F3C3C40F1}"/>
+              </a:ext>
+            </a:extLst>
+          </p:cNvPr>
+          <p:cNvSpPr txBox="1"/>
+          <p:nvPr/>
+        </p:nvSpPr>
+        <p:spPr>
+          <a:xfrm>
+            <a:off x="1120775" y="1421027"/>
+            <a:ext cx="10317892" cy="923328"/>
+          </a:xfrm>
+          <a:prstGeom prst="rect">
+            <a:avLst/>
+          </a:prstGeom>
+          <a:noFill/>
+          <a:ln w="12700" cap="flat">
+            <a:noFill/>
+            <a:miter lim="400000"/>
+          </a:ln>
+          <a:effectLst/>
+          <a:sp3d/>
+        </p:spPr>
+        <p:style>
+          <a:lnRef idx="0">
+            <a:scrgbClr r="0" g="0" b="0"/>
+          </a:lnRef>
+          <a:fillRef idx="0">
+            <a:scrgbClr r="0" g="0" b="0"/>
+          </a:fillRef>
+          <a:effectRef idx="0">
+            <a:scrgbClr r="0" g="0" b="0"/>
+          </a:effectRef>
+          <a:fontRef idx="none"/>
+        </p:style>
+        <p:txBody>
+          <a:bodyPr rot="0" spcFirstLastPara="1" vertOverflow="overflow" horzOverflow="overflow" vert="horz" wrap="square" lIns="45719" tIns="45719" rIns="45719" bIns="45719" numCol="1" spcCol="38100" rtlCol="0" anchor="t">
+            <a:spAutoFit/>
+          </a:bodyPr>
+          <a:lstStyle/>
+          <a:p>
+            <a:pPr hangingPunct="0"/>
+            <a:r>
+              <a:rPr lang="en-GB" dirty="0">
+                <a:solidFill>
+                  <a:schemeClr val="accent4"/>
+                </a:solidFill>
+              </a:rPr>
+              <a:t>Member field can be static. In this case, it will be associated with the class type itself, and not with the class instance. Consider a standard example: a class that contains a counter that allows you to find out how many objects of this class are currently instantiated</a:t>
+            </a:r>
+            <a:r>
+              <a:rPr lang="en-US" dirty="0">
+                <a:solidFill>
+                  <a:schemeClr val="accent4"/>
+                </a:solidFill>
+              </a:rPr>
+              <a:t>.</a:t>
+            </a:r>
+            <a:endParaRPr kumimoji="0" lang="en-RU" sz="1800" b="0" i="0" u="none" strike="noStrike" cap="none" spc="0" normalizeH="0" baseline="0" dirty="0">
+              <a:ln>
+                <a:noFill/>
+              </a:ln>
+              <a:solidFill>
+                <a:schemeClr val="accent4"/>
+              </a:solidFill>
+              <a:effectLst/>
+              <a:uFillTx/>
+              <a:latin typeface="+mj-lt"/>
+              <a:ea typeface="+mj-ea"/>
+              <a:cs typeface="+mj-cs"/>
+              <a:sym typeface="Calibri"/>
+            </a:endParaRPr>
+          </a:p>
+        </p:txBody>
+      </p:sp>
+      <p:pic>
+        <p:nvPicPr>
+          <p:cNvPr id="7" name="Picture 6">
+            <a:extLst>
+              <a:ext uri="{FF2B5EF4-FFF2-40B4-BE49-F238E27FC236}">
+                <a16:creationId xmlns:a16="http://schemas.microsoft.com/office/drawing/2014/main" id="{3D691B0F-932A-144F-A724-DB4ED9EBCE22}"/>
+              </a:ext>
+            </a:extLst>
+          </p:cNvPr>
+          <p:cNvPicPr>
+            <a:picLocks noChangeAspect="1"/>
+          </p:cNvPicPr>
+          <p:nvPr/>
+        </p:nvPicPr>
+        <p:blipFill>
+          <a:blip r:embed="rId3">
+            <a:extLst>
+              <a:ext uri="{28A0092B-C50C-407E-A947-70E740481C1C}">
+                <a14:useLocalDpi xmlns:a14="http://schemas.microsoft.com/office/drawing/2010/main" val="0"/>
+              </a:ext>
+            </a:extLst>
+          </a:blip>
+          <a:stretch>
+            <a:fillRect/>
+          </a:stretch>
+        </p:blipFill>
+        <p:spPr>
+          <a:xfrm>
+            <a:off x="1120775" y="3378134"/>
+            <a:ext cx="3098800" cy="2247900"/>
+          </a:xfrm>
+          <a:prstGeom prst="rect">
+            <a:avLst/>
+          </a:prstGeom>
+        </p:spPr>
+      </p:pic>
+      <p:pic>
+        <p:nvPicPr>
+          <p:cNvPr id="9" name="Picture 8">
+            <a:extLst>
+              <a:ext uri="{FF2B5EF4-FFF2-40B4-BE49-F238E27FC236}">
+                <a16:creationId xmlns:a16="http://schemas.microsoft.com/office/drawing/2014/main" id="{62CF4BB7-55CF-3648-875B-6AFBD3512B09}"/>
+              </a:ext>
+            </a:extLst>
+          </p:cNvPr>
+          <p:cNvPicPr>
+            <a:picLocks noChangeAspect="1"/>
+          </p:cNvPicPr>
+          <p:nvPr/>
+        </p:nvPicPr>
+        <p:blipFill>
+          <a:blip r:embed="rId4">
+            <a:extLst>
+              <a:ext uri="{28A0092B-C50C-407E-A947-70E740481C1C}">
+                <a14:useLocalDpi xmlns:a14="http://schemas.microsoft.com/office/drawing/2010/main" val="0"/>
+              </a:ext>
+            </a:extLst>
+          </a:blip>
+          <a:stretch>
+            <a:fillRect/>
+          </a:stretch>
+        </p:blipFill>
+        <p:spPr>
+          <a:xfrm>
+            <a:off x="5940425" y="2495484"/>
+            <a:ext cx="5130800" cy="4013200"/>
+          </a:xfrm>
+          <a:prstGeom prst="rect">
+            <a:avLst/>
+          </a:prstGeom>
+        </p:spPr>
+      </p:pic>
+    </p:spTree>
+    <p:extLst>
+      <p:ext uri="{BB962C8B-B14F-4D97-AF65-F5344CB8AC3E}">
+        <p14:creationId xmlns:p14="http://schemas.microsoft.com/office/powerpoint/2010/main" val="3965167940"/>
+      </p:ext>
+    </p:extLst>
+  </p:cSld>
+  <p:clrMapOvr>
+    <a:masterClrMapping/>
+  </p:clrMapOvr>
+  <p:transition spd="med"/>
+</p:sld>
+</file>
+
+<file path=ppt/slides/slide17.xml><?xml version="1.0" encoding="utf-8"?>
+<p:sld xmlns:a="http://schemas.openxmlformats.org/drawingml/2006/main" xmlns:r="http://schemas.openxmlformats.org/officeDocument/2006/relationships" xmlns:p="http://schemas.openxmlformats.org/presentationml/2006/main">
+  <p:cSld>
+    <p:spTree>
+      <p:nvGrpSpPr>
+        <p:cNvPr id="1" name=""/>
+        <p:cNvGrpSpPr/>
+        <p:nvPr/>
+      </p:nvGrpSpPr>
+      <p:grpSpPr>
+        <a:xfrm>
+          <a:off x="0" y="0"/>
+          <a:ext cx="0" cy="0"/>
+          <a:chOff x="0" y="0"/>
+          <a:chExt cx="0" cy="0"/>
+        </a:xfrm>
+      </p:grpSpPr>
+      <p:sp>
+        <p:nvSpPr>
+          <p:cNvPr id="2" name="Text Placeholder 1">
+            <a:extLst>
+              <a:ext uri="{FF2B5EF4-FFF2-40B4-BE49-F238E27FC236}">
+                <a16:creationId xmlns:a16="http://schemas.microsoft.com/office/drawing/2014/main" id="{EE1642DD-3082-0146-B8C3-B7E8C1DFCC6A}"/>
+              </a:ext>
+            </a:extLst>
+          </p:cNvPr>
+          <p:cNvSpPr>
+            <a:spLocks noGrp="1"/>
+          </p:cNvSpPr>
+          <p:nvPr>
+            <p:ph type="body" sz="quarter" idx="13"/>
+          </p:nvPr>
+        </p:nvSpPr>
+        <p:spPr/>
+        <p:txBody>
+          <a:bodyPr>
+            <a:normAutofit fontScale="92500" lnSpcReduction="20000"/>
+          </a:bodyPr>
+          <a:lstStyle/>
+          <a:p>
+            <a:r>
+              <a:rPr lang="en-US" dirty="0"/>
               <a:t>Implicitly declared and defined destructor</a:t>
             </a:r>
             <a:endParaRPr lang="ru-RU" dirty="0"/>
@@ -7440,7 +7741,7 @@
 </p:sld>
 </file>
 
-<file path=ppt/slides/slide17.xml><?xml version="1.0" encoding="utf-8"?>
+<file path=ppt/slides/slide18.xml><?xml version="1.0" encoding="utf-8"?>
 <p:sld xmlns:a="http://schemas.openxmlformats.org/drawingml/2006/main" xmlns:r="http://schemas.openxmlformats.org/officeDocument/2006/relationships" xmlns:p="http://schemas.openxmlformats.org/presentationml/2006/main">
   <p:cSld>
     <p:spTree>
@@ -7606,7 +7907,7 @@
 </p:sld>
 </file>
 
-<file path=ppt/slides/slide18.xml><?xml version="1.0" encoding="utf-8"?>
+<file path=ppt/slides/slide19.xml><?xml version="1.0" encoding="utf-8"?>
 <p:sld xmlns:a="http://schemas.openxmlformats.org/drawingml/2006/main" xmlns:r="http://schemas.openxmlformats.org/officeDocument/2006/relationships" xmlns:p="http://schemas.openxmlformats.org/presentationml/2006/main">
   <p:cSld>
     <p:spTree>
@@ -7892,284 +8193,6 @@
     <p:extLst>
       <p:ext uri="{BB962C8B-B14F-4D97-AF65-F5344CB8AC3E}">
         <p14:creationId xmlns:p14="http://schemas.microsoft.com/office/powerpoint/2010/main" val="2838025582"/>
-      </p:ext>
-    </p:extLst>
-  </p:cSld>
-  <p:clrMapOvr>
-    <a:masterClrMapping/>
-  </p:clrMapOvr>
-  <p:transition spd="med"/>
-</p:sld>
-</file>
-
-<file path=ppt/slides/slide19.xml><?xml version="1.0" encoding="utf-8"?>
-<p:sld xmlns:a="http://schemas.openxmlformats.org/drawingml/2006/main" xmlns:r="http://schemas.openxmlformats.org/officeDocument/2006/relationships" xmlns:p="http://schemas.openxmlformats.org/presentationml/2006/main">
-  <p:cSld>
-    <p:spTree>
-      <p:nvGrpSpPr>
-        <p:cNvPr id="1" name=""/>
-        <p:cNvGrpSpPr/>
-        <p:nvPr/>
-      </p:nvGrpSpPr>
-      <p:grpSpPr>
-        <a:xfrm>
-          <a:off x="0" y="0"/>
-          <a:ext cx="0" cy="0"/>
-          <a:chOff x="0" y="0"/>
-          <a:chExt cx="0" cy="0"/>
-        </a:xfrm>
-      </p:grpSpPr>
-      <p:sp>
-        <p:nvSpPr>
-          <p:cNvPr id="2" name="Text Placeholder 1">
-            <a:extLst>
-              <a:ext uri="{FF2B5EF4-FFF2-40B4-BE49-F238E27FC236}">
-                <a16:creationId xmlns:a16="http://schemas.microsoft.com/office/drawing/2014/main" id="{EE1642DD-3082-0146-B8C3-B7E8C1DFCC6A}"/>
-              </a:ext>
-            </a:extLst>
-          </p:cNvPr>
-          <p:cNvSpPr>
-            <a:spLocks noGrp="1"/>
-          </p:cNvSpPr>
-          <p:nvPr>
-            <p:ph type="body" sz="quarter" idx="13"/>
-          </p:nvPr>
-        </p:nvSpPr>
-        <p:spPr/>
-        <p:txBody>
-          <a:bodyPr>
-            <a:normAutofit fontScale="92500" lnSpcReduction="20000"/>
-          </a:bodyPr>
-          <a:lstStyle/>
-          <a:p>
-            <a:r>
-              <a:rPr lang="en-US" dirty="0"/>
-              <a:t>Explicit keyword</a:t>
-            </a:r>
-            <a:endParaRPr lang="ru-RU" dirty="0"/>
-          </a:p>
-        </p:txBody>
-      </p:sp>
-      <p:pic>
-        <p:nvPicPr>
-          <p:cNvPr id="6" name="Picture 5">
-            <a:extLst>
-              <a:ext uri="{FF2B5EF4-FFF2-40B4-BE49-F238E27FC236}">
-                <a16:creationId xmlns:a16="http://schemas.microsoft.com/office/drawing/2014/main" id="{FFF99EA5-4CE8-E94D-8F12-F3C857FCB7A9}"/>
-              </a:ext>
-            </a:extLst>
-          </p:cNvPr>
-          <p:cNvPicPr>
-            <a:picLocks noChangeAspect="1"/>
-          </p:cNvPicPr>
-          <p:nvPr/>
-        </p:nvPicPr>
-        <p:blipFill>
-          <a:blip r:embed="rId3">
-            <a:extLst>
-              <a:ext uri="{28A0092B-C50C-407E-A947-70E740481C1C}">
-                <a14:useLocalDpi xmlns:a14="http://schemas.microsoft.com/office/drawing/2010/main" val="0"/>
-              </a:ext>
-            </a:extLst>
-          </a:blip>
-          <a:stretch>
-            <a:fillRect/>
-          </a:stretch>
-        </p:blipFill>
-        <p:spPr>
-          <a:xfrm>
-            <a:off x="1120775" y="1556162"/>
-            <a:ext cx="8648700" cy="3327400"/>
-          </a:xfrm>
-          <a:prstGeom prst="rect">
-            <a:avLst/>
-          </a:prstGeom>
-        </p:spPr>
-      </p:pic>
-      <p:sp>
-        <p:nvSpPr>
-          <p:cNvPr id="8" name="TextBox 7">
-            <a:extLst>
-              <a:ext uri="{FF2B5EF4-FFF2-40B4-BE49-F238E27FC236}">
-                <a16:creationId xmlns:a16="http://schemas.microsoft.com/office/drawing/2014/main" id="{43BC3B43-1503-7D41-83DD-318ECB274F40}"/>
-              </a:ext>
-            </a:extLst>
-          </p:cNvPr>
-          <p:cNvSpPr txBox="1"/>
-          <p:nvPr/>
-        </p:nvSpPr>
-        <p:spPr>
-          <a:xfrm>
-            <a:off x="1136822" y="1150105"/>
-            <a:ext cx="7352270" cy="369330"/>
-          </a:xfrm>
-          <a:prstGeom prst="rect">
-            <a:avLst/>
-          </a:prstGeom>
-          <a:noFill/>
-          <a:ln w="12700" cap="flat">
-            <a:noFill/>
-            <a:miter lim="400000"/>
-          </a:ln>
-          <a:effectLst/>
-          <a:sp3d/>
-        </p:spPr>
-        <p:style>
-          <a:lnRef idx="0">
-            <a:scrgbClr r="0" g="0" b="0"/>
-          </a:lnRef>
-          <a:fillRef idx="0">
-            <a:scrgbClr r="0" g="0" b="0"/>
-          </a:fillRef>
-          <a:effectRef idx="0">
-            <a:scrgbClr r="0" g="0" b="0"/>
-          </a:effectRef>
-          <a:fontRef idx="none"/>
-        </p:style>
-        <p:txBody>
-          <a:bodyPr rot="0" spcFirstLastPara="1" vertOverflow="overflow" horzOverflow="overflow" vert="horz" wrap="square" lIns="45719" tIns="45719" rIns="45719" bIns="45719" numCol="1" spcCol="38100" rtlCol="0" anchor="t">
-            <a:spAutoFit/>
-          </a:bodyPr>
-          <a:lstStyle/>
-          <a:p>
-            <a:pPr hangingPunct="0"/>
-            <a:r>
-              <a:rPr lang="en-GB" dirty="0"/>
-              <a:t>Let's take another look at the logger class:</a:t>
-            </a:r>
-            <a:endParaRPr kumimoji="0" lang="en-RU" sz="1800" b="0" i="0" u="none" strike="noStrike" cap="none" spc="0" normalizeH="0" baseline="0" dirty="0">
-              <a:ln>
-                <a:noFill/>
-              </a:ln>
-              <a:solidFill>
-                <a:srgbClr val="323332"/>
-              </a:solidFill>
-              <a:effectLst/>
-              <a:uFillTx/>
-              <a:latin typeface="+mj-lt"/>
-              <a:ea typeface="+mj-ea"/>
-              <a:cs typeface="+mj-cs"/>
-              <a:sym typeface="Calibri"/>
-            </a:endParaRPr>
-          </a:p>
-        </p:txBody>
-      </p:sp>
-      <p:sp>
-        <p:nvSpPr>
-          <p:cNvPr id="9" name="TextBox 8">
-            <a:extLst>
-              <a:ext uri="{FF2B5EF4-FFF2-40B4-BE49-F238E27FC236}">
-                <a16:creationId xmlns:a16="http://schemas.microsoft.com/office/drawing/2014/main" id="{B60C0AD8-F1AF-6E43-9695-95FA1E3F2080}"/>
-              </a:ext>
-            </a:extLst>
-          </p:cNvPr>
-          <p:cNvSpPr txBox="1"/>
-          <p:nvPr/>
-        </p:nvSpPr>
-        <p:spPr>
-          <a:xfrm>
-            <a:off x="1120775" y="4920289"/>
-            <a:ext cx="10976490" cy="646329"/>
-          </a:xfrm>
-          <a:prstGeom prst="rect">
-            <a:avLst/>
-          </a:prstGeom>
-          <a:noFill/>
-          <a:ln w="12700" cap="flat">
-            <a:noFill/>
-            <a:miter lim="400000"/>
-          </a:ln>
-          <a:effectLst/>
-          <a:sp3d/>
-        </p:spPr>
-        <p:style>
-          <a:lnRef idx="0">
-            <a:scrgbClr r="0" g="0" b="0"/>
-          </a:lnRef>
-          <a:fillRef idx="0">
-            <a:scrgbClr r="0" g="0" b="0"/>
-          </a:fillRef>
-          <a:effectRef idx="0">
-            <a:scrgbClr r="0" g="0" b="0"/>
-          </a:effectRef>
-          <a:fontRef idx="none"/>
-        </p:style>
-        <p:txBody>
-          <a:bodyPr rot="0" spcFirstLastPara="1" vertOverflow="overflow" horzOverflow="overflow" vert="horz" wrap="square" lIns="45719" tIns="45719" rIns="45719" bIns="45719" numCol="1" spcCol="38100" rtlCol="0" anchor="t">
-            <a:spAutoFit/>
-          </a:bodyPr>
-          <a:lstStyle/>
-          <a:p>
-            <a:pPr hangingPunct="0"/>
-            <a:r>
-              <a:rPr lang="en-GB" dirty="0"/>
-              <a:t>As you can see, it has a constructor from one int argument.</a:t>
-            </a:r>
-            <a:endParaRPr lang="ru-RU" dirty="0"/>
-          </a:p>
-          <a:p>
-            <a:pPr hangingPunct="0"/>
-            <a:r>
-              <a:rPr lang="en-GB" dirty="0"/>
-              <a:t>The following code is allowed to compile, which is a problem (it can be confusing in some cases!)</a:t>
-            </a:r>
-            <a:endParaRPr kumimoji="0" lang="en-RU" sz="1800" b="0" i="0" u="none" strike="noStrike" cap="none" spc="0" normalizeH="0" baseline="0" dirty="0">
-              <a:ln>
-                <a:noFill/>
-              </a:ln>
-              <a:solidFill>
-                <a:srgbClr val="323332"/>
-              </a:solidFill>
-              <a:effectLst/>
-              <a:uFillTx/>
-              <a:latin typeface="+mj-lt"/>
-              <a:ea typeface="+mj-ea"/>
-              <a:cs typeface="+mj-cs"/>
-              <a:sym typeface="Calibri"/>
-            </a:endParaRPr>
-          </a:p>
-        </p:txBody>
-      </p:sp>
-      <p:pic>
-        <p:nvPicPr>
-          <p:cNvPr id="11" name="Picture 10">
-            <a:extLst>
-              <a:ext uri="{FF2B5EF4-FFF2-40B4-BE49-F238E27FC236}">
-                <a16:creationId xmlns:a16="http://schemas.microsoft.com/office/drawing/2014/main" id="{09B11038-024A-9049-8140-9BFD2E24A76F}"/>
-              </a:ext>
-            </a:extLst>
-          </p:cNvPr>
-          <p:cNvPicPr>
-            <a:picLocks noChangeAspect="1"/>
-          </p:cNvPicPr>
-          <p:nvPr/>
-        </p:nvPicPr>
-        <p:blipFill>
-          <a:blip r:embed="rId4">
-            <a:extLst>
-              <a:ext uri="{28A0092B-C50C-407E-A947-70E740481C1C}">
-                <a14:useLocalDpi xmlns:a14="http://schemas.microsoft.com/office/drawing/2010/main" val="0"/>
-              </a:ext>
-            </a:extLst>
-          </a:blip>
-          <a:stretch>
-            <a:fillRect/>
-          </a:stretch>
-        </p:blipFill>
-        <p:spPr>
-          <a:xfrm>
-            <a:off x="1136822" y="5603345"/>
-            <a:ext cx="2514600" cy="838200"/>
-          </a:xfrm>
-          <a:prstGeom prst="rect">
-            <a:avLst/>
-          </a:prstGeom>
-        </p:spPr>
-      </p:pic>
-    </p:spTree>
-    <p:extLst>
-      <p:ext uri="{BB962C8B-B14F-4D97-AF65-F5344CB8AC3E}">
-        <p14:creationId xmlns:p14="http://schemas.microsoft.com/office/powerpoint/2010/main" val="4067630376"/>
       </p:ext>
     </p:extLst>
   </p:cSld>
@@ -8456,6 +8479,42 @@
           </a:p>
         </p:txBody>
       </p:sp>
+      <p:pic>
+        <p:nvPicPr>
+          <p:cNvPr id="6" name="Picture 5">
+            <a:extLst>
+              <a:ext uri="{FF2B5EF4-FFF2-40B4-BE49-F238E27FC236}">
+                <a16:creationId xmlns:a16="http://schemas.microsoft.com/office/drawing/2014/main" id="{FFF99EA5-4CE8-E94D-8F12-F3C857FCB7A9}"/>
+              </a:ext>
+            </a:extLst>
+          </p:cNvPr>
+          <p:cNvPicPr>
+            <a:picLocks noChangeAspect="1"/>
+          </p:cNvPicPr>
+          <p:nvPr/>
+        </p:nvPicPr>
+        <p:blipFill>
+          <a:blip r:embed="rId3">
+            <a:extLst>
+              <a:ext uri="{28A0092B-C50C-407E-A947-70E740481C1C}">
+                <a14:useLocalDpi xmlns:a14="http://schemas.microsoft.com/office/drawing/2010/main" val="0"/>
+              </a:ext>
+            </a:extLst>
+          </a:blip>
+          <a:stretch>
+            <a:fillRect/>
+          </a:stretch>
+        </p:blipFill>
+        <p:spPr>
+          <a:xfrm>
+            <a:off x="1120775" y="1556162"/>
+            <a:ext cx="8648700" cy="3327400"/>
+          </a:xfrm>
+          <a:prstGeom prst="rect">
+            <a:avLst/>
+          </a:prstGeom>
+        </p:spPr>
+      </p:pic>
       <p:sp>
         <p:nvSpPr>
           <p:cNvPr id="8" name="TextBox 7">
@@ -8505,6 +8564,248 @@
             <a:pPr hangingPunct="0"/>
             <a:r>
               <a:rPr lang="en-GB" dirty="0"/>
+              <a:t>Let's take another look at the logger class:</a:t>
+            </a:r>
+            <a:endParaRPr kumimoji="0" lang="en-RU" sz="1800" b="0" i="0" u="none" strike="noStrike" cap="none" spc="0" normalizeH="0" baseline="0" dirty="0">
+              <a:ln>
+                <a:noFill/>
+              </a:ln>
+              <a:solidFill>
+                <a:srgbClr val="323332"/>
+              </a:solidFill>
+              <a:effectLst/>
+              <a:uFillTx/>
+              <a:latin typeface="+mj-lt"/>
+              <a:ea typeface="+mj-ea"/>
+              <a:cs typeface="+mj-cs"/>
+              <a:sym typeface="Calibri"/>
+            </a:endParaRPr>
+          </a:p>
+        </p:txBody>
+      </p:sp>
+      <p:sp>
+        <p:nvSpPr>
+          <p:cNvPr id="9" name="TextBox 8">
+            <a:extLst>
+              <a:ext uri="{FF2B5EF4-FFF2-40B4-BE49-F238E27FC236}">
+                <a16:creationId xmlns:a16="http://schemas.microsoft.com/office/drawing/2014/main" id="{B60C0AD8-F1AF-6E43-9695-95FA1E3F2080}"/>
+              </a:ext>
+            </a:extLst>
+          </p:cNvPr>
+          <p:cNvSpPr txBox="1"/>
+          <p:nvPr/>
+        </p:nvSpPr>
+        <p:spPr>
+          <a:xfrm>
+            <a:off x="1120775" y="4920289"/>
+            <a:ext cx="10976490" cy="646329"/>
+          </a:xfrm>
+          <a:prstGeom prst="rect">
+            <a:avLst/>
+          </a:prstGeom>
+          <a:noFill/>
+          <a:ln w="12700" cap="flat">
+            <a:noFill/>
+            <a:miter lim="400000"/>
+          </a:ln>
+          <a:effectLst/>
+          <a:sp3d/>
+        </p:spPr>
+        <p:style>
+          <a:lnRef idx="0">
+            <a:scrgbClr r="0" g="0" b="0"/>
+          </a:lnRef>
+          <a:fillRef idx="0">
+            <a:scrgbClr r="0" g="0" b="0"/>
+          </a:fillRef>
+          <a:effectRef idx="0">
+            <a:scrgbClr r="0" g="0" b="0"/>
+          </a:effectRef>
+          <a:fontRef idx="none"/>
+        </p:style>
+        <p:txBody>
+          <a:bodyPr rot="0" spcFirstLastPara="1" vertOverflow="overflow" horzOverflow="overflow" vert="horz" wrap="square" lIns="45719" tIns="45719" rIns="45719" bIns="45719" numCol="1" spcCol="38100" rtlCol="0" anchor="t">
+            <a:spAutoFit/>
+          </a:bodyPr>
+          <a:lstStyle/>
+          <a:p>
+            <a:pPr hangingPunct="0"/>
+            <a:r>
+              <a:rPr lang="en-GB" dirty="0"/>
+              <a:t>As you can see, it has a constructor from one int argument.</a:t>
+            </a:r>
+            <a:endParaRPr lang="ru-RU" dirty="0"/>
+          </a:p>
+          <a:p>
+            <a:pPr hangingPunct="0"/>
+            <a:r>
+              <a:rPr lang="en-GB" dirty="0"/>
+              <a:t>The following code is allowed to compile, which is a problem (it can be confusing in some cases!)</a:t>
+            </a:r>
+            <a:endParaRPr kumimoji="0" lang="en-RU" sz="1800" b="0" i="0" u="none" strike="noStrike" cap="none" spc="0" normalizeH="0" baseline="0" dirty="0">
+              <a:ln>
+                <a:noFill/>
+              </a:ln>
+              <a:solidFill>
+                <a:srgbClr val="323332"/>
+              </a:solidFill>
+              <a:effectLst/>
+              <a:uFillTx/>
+              <a:latin typeface="+mj-lt"/>
+              <a:ea typeface="+mj-ea"/>
+              <a:cs typeface="+mj-cs"/>
+              <a:sym typeface="Calibri"/>
+            </a:endParaRPr>
+          </a:p>
+        </p:txBody>
+      </p:sp>
+      <p:pic>
+        <p:nvPicPr>
+          <p:cNvPr id="11" name="Picture 10">
+            <a:extLst>
+              <a:ext uri="{FF2B5EF4-FFF2-40B4-BE49-F238E27FC236}">
+                <a16:creationId xmlns:a16="http://schemas.microsoft.com/office/drawing/2014/main" id="{09B11038-024A-9049-8140-9BFD2E24A76F}"/>
+              </a:ext>
+            </a:extLst>
+          </p:cNvPr>
+          <p:cNvPicPr>
+            <a:picLocks noChangeAspect="1"/>
+          </p:cNvPicPr>
+          <p:nvPr/>
+        </p:nvPicPr>
+        <p:blipFill>
+          <a:blip r:embed="rId4">
+            <a:extLst>
+              <a:ext uri="{28A0092B-C50C-407E-A947-70E740481C1C}">
+                <a14:useLocalDpi xmlns:a14="http://schemas.microsoft.com/office/drawing/2010/main" val="0"/>
+              </a:ext>
+            </a:extLst>
+          </a:blip>
+          <a:stretch>
+            <a:fillRect/>
+          </a:stretch>
+        </p:blipFill>
+        <p:spPr>
+          <a:xfrm>
+            <a:off x="1136822" y="5603345"/>
+            <a:ext cx="2514600" cy="838200"/>
+          </a:xfrm>
+          <a:prstGeom prst="rect">
+            <a:avLst/>
+          </a:prstGeom>
+        </p:spPr>
+      </p:pic>
+    </p:spTree>
+    <p:extLst>
+      <p:ext uri="{BB962C8B-B14F-4D97-AF65-F5344CB8AC3E}">
+        <p14:creationId xmlns:p14="http://schemas.microsoft.com/office/powerpoint/2010/main" val="4067630376"/>
+      </p:ext>
+    </p:extLst>
+  </p:cSld>
+  <p:clrMapOvr>
+    <a:masterClrMapping/>
+  </p:clrMapOvr>
+  <p:transition spd="med"/>
+</p:sld>
+</file>
+
+<file path=ppt/slides/slide21.xml><?xml version="1.0" encoding="utf-8"?>
+<p:sld xmlns:a="http://schemas.openxmlformats.org/drawingml/2006/main" xmlns:r="http://schemas.openxmlformats.org/officeDocument/2006/relationships" xmlns:p="http://schemas.openxmlformats.org/presentationml/2006/main">
+  <p:cSld>
+    <p:spTree>
+      <p:nvGrpSpPr>
+        <p:cNvPr id="1" name=""/>
+        <p:cNvGrpSpPr/>
+        <p:nvPr/>
+      </p:nvGrpSpPr>
+      <p:grpSpPr>
+        <a:xfrm>
+          <a:off x="0" y="0"/>
+          <a:ext cx="0" cy="0"/>
+          <a:chOff x="0" y="0"/>
+          <a:chExt cx="0" cy="0"/>
+        </a:xfrm>
+      </p:grpSpPr>
+      <p:sp>
+        <p:nvSpPr>
+          <p:cNvPr id="2" name="Text Placeholder 1">
+            <a:extLst>
+              <a:ext uri="{FF2B5EF4-FFF2-40B4-BE49-F238E27FC236}">
+                <a16:creationId xmlns:a16="http://schemas.microsoft.com/office/drawing/2014/main" id="{EE1642DD-3082-0146-B8C3-B7E8C1DFCC6A}"/>
+              </a:ext>
+            </a:extLst>
+          </p:cNvPr>
+          <p:cNvSpPr>
+            <a:spLocks noGrp="1"/>
+          </p:cNvSpPr>
+          <p:nvPr>
+            <p:ph type="body" sz="quarter" idx="13"/>
+          </p:nvPr>
+        </p:nvSpPr>
+        <p:spPr/>
+        <p:txBody>
+          <a:bodyPr>
+            <a:normAutofit fontScale="92500" lnSpcReduction="20000"/>
+          </a:bodyPr>
+          <a:lstStyle/>
+          <a:p>
+            <a:r>
+              <a:rPr lang="en-US" dirty="0"/>
+              <a:t>Explicit keyword</a:t>
+            </a:r>
+            <a:endParaRPr lang="ru-RU" dirty="0"/>
+          </a:p>
+        </p:txBody>
+      </p:sp>
+      <p:sp>
+        <p:nvSpPr>
+          <p:cNvPr id="8" name="TextBox 7">
+            <a:extLst>
+              <a:ext uri="{FF2B5EF4-FFF2-40B4-BE49-F238E27FC236}">
+                <a16:creationId xmlns:a16="http://schemas.microsoft.com/office/drawing/2014/main" id="{43BC3B43-1503-7D41-83DD-318ECB274F40}"/>
+              </a:ext>
+            </a:extLst>
+          </p:cNvPr>
+          <p:cNvSpPr txBox="1"/>
+          <p:nvPr/>
+        </p:nvSpPr>
+        <p:spPr>
+          <a:xfrm>
+            <a:off x="1136822" y="1150105"/>
+            <a:ext cx="7352270" cy="369330"/>
+          </a:xfrm>
+          <a:prstGeom prst="rect">
+            <a:avLst/>
+          </a:prstGeom>
+          <a:noFill/>
+          <a:ln w="12700" cap="flat">
+            <a:noFill/>
+            <a:miter lim="400000"/>
+          </a:ln>
+          <a:effectLst/>
+          <a:sp3d/>
+        </p:spPr>
+        <p:style>
+          <a:lnRef idx="0">
+            <a:scrgbClr r="0" g="0" b="0"/>
+          </a:lnRef>
+          <a:fillRef idx="0">
+            <a:scrgbClr r="0" g="0" b="0"/>
+          </a:fillRef>
+          <a:effectRef idx="0">
+            <a:scrgbClr r="0" g="0" b="0"/>
+          </a:effectRef>
+          <a:fontRef idx="none"/>
+        </p:style>
+        <p:txBody>
+          <a:bodyPr rot="0" spcFirstLastPara="1" vertOverflow="overflow" horzOverflow="overflow" vert="horz" wrap="square" lIns="45719" tIns="45719" rIns="45719" bIns="45719" numCol="1" spcCol="38100" rtlCol="0" anchor="t">
+            <a:spAutoFit/>
+          </a:bodyPr>
+          <a:lstStyle/>
+          <a:p>
+            <a:pPr hangingPunct="0"/>
+            <a:r>
+              <a:rPr lang="en-GB" dirty="0"/>
               <a:t>But if we declare a constructor as explicit, it won’t work anymore.</a:t>
             </a:r>
             <a:endParaRPr kumimoji="0" lang="en-RU" sz="1800" b="0" i="0" u="none" strike="noStrike" cap="none" spc="0" normalizeH="0" baseline="0" dirty="0">
@@ -8642,7 +8943,7 @@
 </p:sld>
 </file>
 
-<file path=ppt/slides/slide21.xml><?xml version="1.0" encoding="utf-8"?>
+<file path=ppt/slides/slide22.xml><?xml version="1.0" encoding="utf-8"?>
 <p:sld xmlns:a="http://schemas.openxmlformats.org/drawingml/2006/main" xmlns:r="http://schemas.openxmlformats.org/officeDocument/2006/relationships" xmlns:p="http://schemas.openxmlformats.org/presentationml/2006/main">
   <p:cSld>
     <p:spTree>
@@ -8907,7 +9208,7 @@
 </p:sld>
 </file>
 
-<file path=ppt/slides/slide22.xml><?xml version="1.0" encoding="utf-8"?>
+<file path=ppt/slides/slide23.xml><?xml version="1.0" encoding="utf-8"?>
 <p:sld xmlns:a="http://schemas.openxmlformats.org/drawingml/2006/main" xmlns:r="http://schemas.openxmlformats.org/officeDocument/2006/relationships" xmlns:p="http://schemas.openxmlformats.org/presentationml/2006/main">
   <p:cSld>
     <p:bg>
@@ -9240,7 +9541,7 @@
 </p:sld>
 </file>
 
-<file path=ppt/slides/slide23.xml><?xml version="1.0" encoding="utf-8"?>
+<file path=ppt/slides/slide24.xml><?xml version="1.0" encoding="utf-8"?>
 <p:sld xmlns:a="http://schemas.openxmlformats.org/drawingml/2006/main" xmlns:r="http://schemas.openxmlformats.org/officeDocument/2006/relationships" xmlns:p="http://schemas.openxmlformats.org/presentationml/2006/main">
   <p:cSld>
     <p:spTree>
@@ -9563,7 +9864,7 @@
 </p:sld>
 </file>
 
-<file path=ppt/slides/slide24.xml><?xml version="1.0" encoding="utf-8"?>
+<file path=ppt/slides/slide25.xml><?xml version="1.0" encoding="utf-8"?>
 <p:sld xmlns:a="http://schemas.openxmlformats.org/drawingml/2006/main" xmlns:r="http://schemas.openxmlformats.org/officeDocument/2006/relationships" xmlns:p="http://schemas.openxmlformats.org/presentationml/2006/main">
   <p:cSld>
     <p:spTree>
@@ -9741,7 +10042,7 @@
 </p:sld>
 </file>
 
-<file path=ppt/slides/slide25.xml><?xml version="1.0" encoding="utf-8"?>
+<file path=ppt/slides/slide26.xml><?xml version="1.0" encoding="utf-8"?>
 <p:sld xmlns:a="http://schemas.openxmlformats.org/drawingml/2006/main" xmlns:r="http://schemas.openxmlformats.org/officeDocument/2006/relationships" xmlns:p="http://schemas.openxmlformats.org/presentationml/2006/main">
   <p:cSld>
     <p:spTree>
@@ -9907,7 +10208,7 @@
 </p:sld>
 </file>
 
-<file path=ppt/slides/slide26.xml><?xml version="1.0" encoding="utf-8"?>
+<file path=ppt/slides/slide27.xml><?xml version="1.0" encoding="utf-8"?>
 <p:sld xmlns:a="http://schemas.openxmlformats.org/drawingml/2006/main" xmlns:r="http://schemas.openxmlformats.org/officeDocument/2006/relationships" xmlns:p="http://schemas.openxmlformats.org/presentationml/2006/main">
   <p:cSld>
     <p:spTree>
@@ -10073,7 +10374,7 @@
 </p:sld>
 </file>
 
-<file path=ppt/slides/slide27.xml><?xml version="1.0" encoding="utf-8"?>
+<file path=ppt/slides/slide28.xml><?xml version="1.0" encoding="utf-8"?>
 <p:sld xmlns:a="http://schemas.openxmlformats.org/drawingml/2006/main" xmlns:r="http://schemas.openxmlformats.org/officeDocument/2006/relationships" xmlns:p="http://schemas.openxmlformats.org/presentationml/2006/main">
   <p:cSld>
     <p:spTree>
@@ -10272,7 +10573,7 @@
 </p:sld>
 </file>
 
-<file path=ppt/slides/slide28.xml><?xml version="1.0" encoding="utf-8"?>
+<file path=ppt/slides/slide29.xml><?xml version="1.0" encoding="utf-8"?>
 <p:sld xmlns:a="http://schemas.openxmlformats.org/drawingml/2006/main" xmlns:r="http://schemas.openxmlformats.org/officeDocument/2006/relationships" xmlns:p="http://schemas.openxmlformats.org/presentationml/2006/main">
   <p:cSld>
     <p:spTree>
@@ -10562,7 +10863,236 @@
 </p:sld>
 </file>
 
-<file path=ppt/slides/slide29.xml><?xml version="1.0" encoding="utf-8"?>
+<file path=ppt/slides/slide3.xml><?xml version="1.0" encoding="utf-8"?>
+<p:sld xmlns:a="http://schemas.openxmlformats.org/drawingml/2006/main" xmlns:r="http://schemas.openxmlformats.org/officeDocument/2006/relationships" xmlns:p="http://schemas.openxmlformats.org/presentationml/2006/main">
+  <p:cSld>
+    <p:spTree>
+      <p:nvGrpSpPr>
+        <p:cNvPr id="1" name=""/>
+        <p:cNvGrpSpPr/>
+        <p:nvPr/>
+      </p:nvGrpSpPr>
+      <p:grpSpPr>
+        <a:xfrm>
+          <a:off x="0" y="0"/>
+          <a:ext cx="0" cy="0"/>
+          <a:chOff x="0" y="0"/>
+          <a:chExt cx="0" cy="0"/>
+        </a:xfrm>
+      </p:grpSpPr>
+      <p:sp>
+        <p:nvSpPr>
+          <p:cNvPr id="2" name="Text Placeholder 1">
+            <a:extLst>
+              <a:ext uri="{FF2B5EF4-FFF2-40B4-BE49-F238E27FC236}">
+                <a16:creationId xmlns:a16="http://schemas.microsoft.com/office/drawing/2014/main" id="{EE1642DD-3082-0146-B8C3-B7E8C1DFCC6A}"/>
+              </a:ext>
+            </a:extLst>
+          </p:cNvPr>
+          <p:cNvSpPr>
+            <a:spLocks noGrp="1"/>
+          </p:cNvSpPr>
+          <p:nvPr>
+            <p:ph type="body" sz="quarter" idx="13"/>
+          </p:nvPr>
+        </p:nvSpPr>
+        <p:spPr/>
+        <p:txBody>
+          <a:bodyPr>
+            <a:normAutofit fontScale="92500" lnSpcReduction="20000"/>
+          </a:bodyPr>
+          <a:lstStyle/>
+          <a:p>
+            <a:r>
+              <a:rPr lang="en-US" dirty="0"/>
+              <a:t>Default constructor</a:t>
+            </a:r>
+            <a:endParaRPr lang="ru-RU" dirty="0"/>
+          </a:p>
+        </p:txBody>
+      </p:sp>
+      <p:sp>
+        <p:nvSpPr>
+          <p:cNvPr id="4" name="TextBox 3">
+            <a:extLst>
+              <a:ext uri="{FF2B5EF4-FFF2-40B4-BE49-F238E27FC236}">
+                <a16:creationId xmlns:a16="http://schemas.microsoft.com/office/drawing/2014/main" id="{51290ADC-D4FE-2C4D-A0B3-B3DCD934630B}"/>
+              </a:ext>
+            </a:extLst>
+          </p:cNvPr>
+          <p:cNvSpPr txBox="1"/>
+          <p:nvPr/>
+        </p:nvSpPr>
+        <p:spPr>
+          <a:xfrm>
+            <a:off x="1120775" y="1269003"/>
+            <a:ext cx="5354166" cy="3970318"/>
+          </a:xfrm>
+          <a:prstGeom prst="rect">
+            <a:avLst/>
+          </a:prstGeom>
+          <a:noFill/>
+          <a:ln w="12700" cap="flat">
+            <a:noFill/>
+            <a:miter lim="400000"/>
+          </a:ln>
+          <a:effectLst/>
+          <a:sp3d/>
+        </p:spPr>
+        <p:style>
+          <a:lnRef idx="0">
+            <a:scrgbClr r="0" g="0" b="0"/>
+          </a:lnRef>
+          <a:fillRef idx="0">
+            <a:scrgbClr r="0" g="0" b="0"/>
+          </a:fillRef>
+          <a:effectRef idx="0">
+            <a:scrgbClr r="0" g="0" b="0"/>
+          </a:effectRef>
+          <a:fontRef idx="none"/>
+        </p:style>
+        <p:txBody>
+          <a:bodyPr wrap="square">
+            <a:spAutoFit/>
+          </a:bodyPr>
+          <a:lstStyle/>
+          <a:p>
+            <a:r>
+              <a:rPr lang="en-GB" dirty="0"/>
+              <a:t>A default constructor is a constructor which can be called with no arguments (either defined with an empty parameter list, or with default arguments provided for every parameter). A type with a public default constructor is called </a:t>
+            </a:r>
+            <a:r>
+              <a:rPr lang="en-GB" b="1" dirty="0" err="1">
+                <a:solidFill>
+                  <a:srgbClr val="0169B3"/>
+                </a:solidFill>
+              </a:rPr>
+              <a:t>DefaultConstructible</a:t>
+            </a:r>
+            <a:r>
+              <a:rPr lang="en-GB" dirty="0"/>
+              <a:t>.</a:t>
+            </a:r>
+          </a:p>
+          <a:p>
+            <a:br>
+              <a:rPr lang="en-GB" dirty="0"/>
+            </a:br>
+            <a:r>
+              <a:rPr lang="en-GB" dirty="0"/>
+              <a:t>You should not write parentheses when creating an instance to call the default constructor.</a:t>
+            </a:r>
+          </a:p>
+          <a:p>
+            <a:endParaRPr lang="en-GB" dirty="0"/>
+          </a:p>
+          <a:p>
+            <a:endParaRPr lang="en-GB" dirty="0"/>
+          </a:p>
+          <a:p>
+            <a:r>
+              <a:rPr lang="en-GB" dirty="0"/>
+              <a:t>A constructor, all arguments of which </a:t>
+            </a:r>
+            <a:r>
+              <a:rPr lang="en-GB" b="1" dirty="0"/>
+              <a:t>have default values</a:t>
+            </a:r>
+            <a:r>
+              <a:rPr lang="en-GB" dirty="0"/>
+              <a:t>, is also a default constructor (because formally, it can be called without passing values ​​from the outside!):</a:t>
+            </a:r>
+            <a:endParaRPr lang="en-RU" dirty="0"/>
+          </a:p>
+        </p:txBody>
+      </p:sp>
+      <p:pic>
+        <p:nvPicPr>
+          <p:cNvPr id="5" name="Picture 4">
+            <a:extLst>
+              <a:ext uri="{FF2B5EF4-FFF2-40B4-BE49-F238E27FC236}">
+                <a16:creationId xmlns:a16="http://schemas.microsoft.com/office/drawing/2014/main" id="{9623BFEB-79B7-0847-AA7D-1D088A3DB2B1}"/>
+              </a:ext>
+            </a:extLst>
+          </p:cNvPr>
+          <p:cNvPicPr>
+            <a:picLocks noChangeAspect="1"/>
+          </p:cNvPicPr>
+          <p:nvPr/>
+        </p:nvPicPr>
+        <p:blipFill>
+          <a:blip r:embed="rId3">
+            <a:extLst>
+              <a:ext uri="{28A0092B-C50C-407E-A947-70E740481C1C}">
+                <a14:useLocalDpi xmlns:a14="http://schemas.microsoft.com/office/drawing/2010/main" val="0"/>
+              </a:ext>
+            </a:extLst>
+          </a:blip>
+          <a:stretch>
+            <a:fillRect/>
+          </a:stretch>
+        </p:blipFill>
+        <p:spPr>
+          <a:xfrm>
+            <a:off x="6619105" y="1269003"/>
+            <a:ext cx="4601970" cy="4943218"/>
+          </a:xfrm>
+          <a:prstGeom prst="rect">
+            <a:avLst/>
+          </a:prstGeom>
+        </p:spPr>
+      </p:pic>
+      <p:pic>
+        <p:nvPicPr>
+          <p:cNvPr id="9" name="Picture 8">
+            <a:extLst>
+              <a:ext uri="{FF2B5EF4-FFF2-40B4-BE49-F238E27FC236}">
+                <a16:creationId xmlns:a16="http://schemas.microsoft.com/office/drawing/2014/main" id="{864AD2D9-9E45-1246-BCEF-AAD41D3BCDCD}"/>
+              </a:ext>
+            </a:extLst>
+          </p:cNvPr>
+          <p:cNvPicPr>
+            <a:picLocks noChangeAspect="1"/>
+          </p:cNvPicPr>
+          <p:nvPr/>
+        </p:nvPicPr>
+        <p:blipFill>
+          <a:blip r:embed="rId4">
+            <a:extLst>
+              <a:ext uri="{28A0092B-C50C-407E-A947-70E740481C1C}">
+                <a14:useLocalDpi xmlns:a14="http://schemas.microsoft.com/office/drawing/2010/main" val="0"/>
+              </a:ext>
+            </a:extLst>
+          </a:blip>
+          <a:stretch>
+            <a:fillRect/>
+          </a:stretch>
+        </p:blipFill>
+        <p:spPr>
+          <a:xfrm>
+            <a:off x="1207274" y="5239321"/>
+            <a:ext cx="3771900" cy="1384300"/>
+          </a:xfrm>
+          <a:prstGeom prst="rect">
+            <a:avLst/>
+          </a:prstGeom>
+        </p:spPr>
+      </p:pic>
+    </p:spTree>
+    <p:extLst>
+      <p:ext uri="{BB962C8B-B14F-4D97-AF65-F5344CB8AC3E}">
+        <p14:creationId xmlns:p14="http://schemas.microsoft.com/office/powerpoint/2010/main" val="3341185757"/>
+      </p:ext>
+    </p:extLst>
+  </p:cSld>
+  <p:clrMapOvr>
+    <a:masterClrMapping/>
+  </p:clrMapOvr>
+  <p:transition spd="med"/>
+</p:sld>
+</file>
+
+<file path=ppt/slides/slide30.xml><?xml version="1.0" encoding="utf-8"?>
 <p:sld xmlns:a="http://schemas.openxmlformats.org/drawingml/2006/main" xmlns:r="http://schemas.openxmlformats.org/officeDocument/2006/relationships" xmlns:p="http://schemas.openxmlformats.org/presentationml/2006/main">
   <p:cSld>
     <p:spTree>
@@ -10749,236 +11279,7 @@
 </p:sld>
 </file>
 
-<file path=ppt/slides/slide3.xml><?xml version="1.0" encoding="utf-8"?>
-<p:sld xmlns:a="http://schemas.openxmlformats.org/drawingml/2006/main" xmlns:r="http://schemas.openxmlformats.org/officeDocument/2006/relationships" xmlns:p="http://schemas.openxmlformats.org/presentationml/2006/main">
-  <p:cSld>
-    <p:spTree>
-      <p:nvGrpSpPr>
-        <p:cNvPr id="1" name=""/>
-        <p:cNvGrpSpPr/>
-        <p:nvPr/>
-      </p:nvGrpSpPr>
-      <p:grpSpPr>
-        <a:xfrm>
-          <a:off x="0" y="0"/>
-          <a:ext cx="0" cy="0"/>
-          <a:chOff x="0" y="0"/>
-          <a:chExt cx="0" cy="0"/>
-        </a:xfrm>
-      </p:grpSpPr>
-      <p:sp>
-        <p:nvSpPr>
-          <p:cNvPr id="2" name="Text Placeholder 1">
-            <a:extLst>
-              <a:ext uri="{FF2B5EF4-FFF2-40B4-BE49-F238E27FC236}">
-                <a16:creationId xmlns:a16="http://schemas.microsoft.com/office/drawing/2014/main" id="{EE1642DD-3082-0146-B8C3-B7E8C1DFCC6A}"/>
-              </a:ext>
-            </a:extLst>
-          </p:cNvPr>
-          <p:cNvSpPr>
-            <a:spLocks noGrp="1"/>
-          </p:cNvSpPr>
-          <p:nvPr>
-            <p:ph type="body" sz="quarter" idx="13"/>
-          </p:nvPr>
-        </p:nvSpPr>
-        <p:spPr/>
-        <p:txBody>
-          <a:bodyPr>
-            <a:normAutofit fontScale="92500" lnSpcReduction="20000"/>
-          </a:bodyPr>
-          <a:lstStyle/>
-          <a:p>
-            <a:r>
-              <a:rPr lang="en-US" dirty="0"/>
-              <a:t>Default constructor</a:t>
-            </a:r>
-            <a:endParaRPr lang="ru-RU" dirty="0"/>
-          </a:p>
-        </p:txBody>
-      </p:sp>
-      <p:sp>
-        <p:nvSpPr>
-          <p:cNvPr id="4" name="TextBox 3">
-            <a:extLst>
-              <a:ext uri="{FF2B5EF4-FFF2-40B4-BE49-F238E27FC236}">
-                <a16:creationId xmlns:a16="http://schemas.microsoft.com/office/drawing/2014/main" id="{51290ADC-D4FE-2C4D-A0B3-B3DCD934630B}"/>
-              </a:ext>
-            </a:extLst>
-          </p:cNvPr>
-          <p:cNvSpPr txBox="1"/>
-          <p:nvPr/>
-        </p:nvSpPr>
-        <p:spPr>
-          <a:xfrm>
-            <a:off x="1120775" y="1269003"/>
-            <a:ext cx="5354166" cy="3970318"/>
-          </a:xfrm>
-          <a:prstGeom prst="rect">
-            <a:avLst/>
-          </a:prstGeom>
-          <a:noFill/>
-          <a:ln w="12700" cap="flat">
-            <a:noFill/>
-            <a:miter lim="400000"/>
-          </a:ln>
-          <a:effectLst/>
-          <a:sp3d/>
-        </p:spPr>
-        <p:style>
-          <a:lnRef idx="0">
-            <a:scrgbClr r="0" g="0" b="0"/>
-          </a:lnRef>
-          <a:fillRef idx="0">
-            <a:scrgbClr r="0" g="0" b="0"/>
-          </a:fillRef>
-          <a:effectRef idx="0">
-            <a:scrgbClr r="0" g="0" b="0"/>
-          </a:effectRef>
-          <a:fontRef idx="none"/>
-        </p:style>
-        <p:txBody>
-          <a:bodyPr wrap="square">
-            <a:spAutoFit/>
-          </a:bodyPr>
-          <a:lstStyle/>
-          <a:p>
-            <a:r>
-              <a:rPr lang="en-GB" dirty="0"/>
-              <a:t>A default constructor is a constructor which can be called with no arguments (either defined with an empty parameter list, or with default arguments provided for every parameter). A type with a public default constructor is called </a:t>
-            </a:r>
-            <a:r>
-              <a:rPr lang="en-GB" b="1" dirty="0" err="1">
-                <a:solidFill>
-                  <a:srgbClr val="0169B3"/>
-                </a:solidFill>
-              </a:rPr>
-              <a:t>DefaultConstructible</a:t>
-            </a:r>
-            <a:r>
-              <a:rPr lang="en-GB" dirty="0"/>
-              <a:t>.</a:t>
-            </a:r>
-          </a:p>
-          <a:p>
-            <a:br>
-              <a:rPr lang="en-GB" dirty="0"/>
-            </a:br>
-            <a:r>
-              <a:rPr lang="en-GB" dirty="0"/>
-              <a:t>You should not write parentheses when creating an instance to call the default constructor.</a:t>
-            </a:r>
-          </a:p>
-          <a:p>
-            <a:endParaRPr lang="en-GB" dirty="0"/>
-          </a:p>
-          <a:p>
-            <a:endParaRPr lang="en-GB" dirty="0"/>
-          </a:p>
-          <a:p>
-            <a:r>
-              <a:rPr lang="en-GB" dirty="0"/>
-              <a:t>A constructor, all arguments of which </a:t>
-            </a:r>
-            <a:r>
-              <a:rPr lang="en-GB" b="1" dirty="0"/>
-              <a:t>have default values</a:t>
-            </a:r>
-            <a:r>
-              <a:rPr lang="en-GB" dirty="0"/>
-              <a:t>, is also a default constructor (because formally, it can be called without passing values ​​from the outside!):</a:t>
-            </a:r>
-            <a:endParaRPr lang="en-RU" dirty="0"/>
-          </a:p>
-        </p:txBody>
-      </p:sp>
-      <p:pic>
-        <p:nvPicPr>
-          <p:cNvPr id="5" name="Picture 4">
-            <a:extLst>
-              <a:ext uri="{FF2B5EF4-FFF2-40B4-BE49-F238E27FC236}">
-                <a16:creationId xmlns:a16="http://schemas.microsoft.com/office/drawing/2014/main" id="{9623BFEB-79B7-0847-AA7D-1D088A3DB2B1}"/>
-              </a:ext>
-            </a:extLst>
-          </p:cNvPr>
-          <p:cNvPicPr>
-            <a:picLocks noChangeAspect="1"/>
-          </p:cNvPicPr>
-          <p:nvPr/>
-        </p:nvPicPr>
-        <p:blipFill>
-          <a:blip r:embed="rId3">
-            <a:extLst>
-              <a:ext uri="{28A0092B-C50C-407E-A947-70E740481C1C}">
-                <a14:useLocalDpi xmlns:a14="http://schemas.microsoft.com/office/drawing/2010/main" val="0"/>
-              </a:ext>
-            </a:extLst>
-          </a:blip>
-          <a:stretch>
-            <a:fillRect/>
-          </a:stretch>
-        </p:blipFill>
-        <p:spPr>
-          <a:xfrm>
-            <a:off x="6619105" y="1269003"/>
-            <a:ext cx="4601970" cy="4943218"/>
-          </a:xfrm>
-          <a:prstGeom prst="rect">
-            <a:avLst/>
-          </a:prstGeom>
-        </p:spPr>
-      </p:pic>
-      <p:pic>
-        <p:nvPicPr>
-          <p:cNvPr id="9" name="Picture 8">
-            <a:extLst>
-              <a:ext uri="{FF2B5EF4-FFF2-40B4-BE49-F238E27FC236}">
-                <a16:creationId xmlns:a16="http://schemas.microsoft.com/office/drawing/2014/main" id="{864AD2D9-9E45-1246-BCEF-AAD41D3BCDCD}"/>
-              </a:ext>
-            </a:extLst>
-          </p:cNvPr>
-          <p:cNvPicPr>
-            <a:picLocks noChangeAspect="1"/>
-          </p:cNvPicPr>
-          <p:nvPr/>
-        </p:nvPicPr>
-        <p:blipFill>
-          <a:blip r:embed="rId4">
-            <a:extLst>
-              <a:ext uri="{28A0092B-C50C-407E-A947-70E740481C1C}">
-                <a14:useLocalDpi xmlns:a14="http://schemas.microsoft.com/office/drawing/2010/main" val="0"/>
-              </a:ext>
-            </a:extLst>
-          </a:blip>
-          <a:stretch>
-            <a:fillRect/>
-          </a:stretch>
-        </p:blipFill>
-        <p:spPr>
-          <a:xfrm>
-            <a:off x="1207274" y="5239321"/>
-            <a:ext cx="3771900" cy="1384300"/>
-          </a:xfrm>
-          <a:prstGeom prst="rect">
-            <a:avLst/>
-          </a:prstGeom>
-        </p:spPr>
-      </p:pic>
-    </p:spTree>
-    <p:extLst>
-      <p:ext uri="{BB962C8B-B14F-4D97-AF65-F5344CB8AC3E}">
-        <p14:creationId xmlns:p14="http://schemas.microsoft.com/office/powerpoint/2010/main" val="3341185757"/>
-      </p:ext>
-    </p:extLst>
-  </p:cSld>
-  <p:clrMapOvr>
-    <a:masterClrMapping/>
-  </p:clrMapOvr>
-  <p:transition spd="med"/>
-</p:sld>
-</file>
-
-<file path=ppt/slides/slide30.xml><?xml version="1.0" encoding="utf-8"?>
+<file path=ppt/slides/slide31.xml><?xml version="1.0" encoding="utf-8"?>
 <p:sld xmlns:a="http://schemas.openxmlformats.org/drawingml/2006/main" xmlns:r="http://schemas.openxmlformats.org/officeDocument/2006/relationships" xmlns:p="http://schemas.openxmlformats.org/presentationml/2006/main">
   <p:cSld>
     <p:spTree>

</xml_diff>